<commit_message>
Final updates to slide deck and R code to include top 2 primary sectors within each Others main sector for all three countries
</commit_message>
<xml_diff>
--- a/Investment-case-study-group-project/Spark Funds Presentation - V2.pptx
+++ b/Investment-case-study-group-project/Spark Funds Presentation - V2.pptx
@@ -221,7 +221,7 @@
             <a:fld id="{2E309023-AF2B-4043-B228-F191CADC9BB1}" type="datetimeFigureOut">
               <a:rPr lang="en-IN" smtClean="0"/>
               <a:pPr/>
-              <a:t>03-12-2017</a:t>
+              <a:t>03/12/17</a:t>
             </a:fld>
             <a:endParaRPr lang="en-IN" dirty="0"/>
           </a:p>
@@ -622,7 +622,7 @@
             <a:fld id="{70C018FE-C8D6-4A9C-A702-41F1E0C1C452}" type="datetimeFigureOut">
               <a:rPr lang="en-IN" smtClean="0"/>
               <a:pPr/>
-              <a:t>03-12-2017</a:t>
+              <a:t>03/12/17</a:t>
             </a:fld>
             <a:endParaRPr lang="en-IN" dirty="0"/>
           </a:p>
@@ -794,7 +794,7 @@
             <a:fld id="{70C018FE-C8D6-4A9C-A702-41F1E0C1C452}" type="datetimeFigureOut">
               <a:rPr lang="en-IN" smtClean="0"/>
               <a:pPr/>
-              <a:t>03-12-2017</a:t>
+              <a:t>03/12/17</a:t>
             </a:fld>
             <a:endParaRPr lang="en-IN" dirty="0"/>
           </a:p>
@@ -976,7 +976,7 @@
             <a:fld id="{70C018FE-C8D6-4A9C-A702-41F1E0C1C452}" type="datetimeFigureOut">
               <a:rPr lang="en-IN" smtClean="0"/>
               <a:pPr/>
-              <a:t>03-12-2017</a:t>
+              <a:t>03/12/17</a:t>
             </a:fld>
             <a:endParaRPr lang="en-IN" dirty="0"/>
           </a:p>
@@ -1407,7 +1407,7 @@
             <a:fld id="{70C018FE-C8D6-4A9C-A702-41F1E0C1C452}" type="datetimeFigureOut">
               <a:rPr lang="en-IN" smtClean="0"/>
               <a:pPr/>
-              <a:t>03-12-2017</a:t>
+              <a:t>03/12/17</a:t>
             </a:fld>
             <a:endParaRPr lang="en-IN" dirty="0"/>
           </a:p>
@@ -1641,7 +1641,7 @@
             <a:fld id="{70C018FE-C8D6-4A9C-A702-41F1E0C1C452}" type="datetimeFigureOut">
               <a:rPr lang="en-IN" smtClean="0"/>
               <a:pPr/>
-              <a:t>03-12-2017</a:t>
+              <a:t>03/12/17</a:t>
             </a:fld>
             <a:endParaRPr lang="en-IN" dirty="0"/>
           </a:p>
@@ -2010,7 +2010,7 @@
             <a:fld id="{70C018FE-C8D6-4A9C-A702-41F1E0C1C452}" type="datetimeFigureOut">
               <a:rPr lang="en-IN" smtClean="0"/>
               <a:pPr/>
-              <a:t>03-12-2017</a:t>
+              <a:t>03/12/17</a:t>
             </a:fld>
             <a:endParaRPr lang="en-IN" dirty="0"/>
           </a:p>
@@ -2130,7 +2130,7 @@
             <a:fld id="{70C018FE-C8D6-4A9C-A702-41F1E0C1C452}" type="datetimeFigureOut">
               <a:rPr lang="en-IN" smtClean="0"/>
               <a:pPr/>
-              <a:t>03-12-2017</a:t>
+              <a:t>03/12/17</a:t>
             </a:fld>
             <a:endParaRPr lang="en-IN" dirty="0"/>
           </a:p>
@@ -2227,7 +2227,7 @@
             <a:fld id="{70C018FE-C8D6-4A9C-A702-41F1E0C1C452}" type="datetimeFigureOut">
               <a:rPr lang="en-IN" smtClean="0"/>
               <a:pPr/>
-              <a:t>03-12-2017</a:t>
+              <a:t>03/12/17</a:t>
             </a:fld>
             <a:endParaRPr lang="en-IN" dirty="0"/>
           </a:p>
@@ -2505,7 +2505,7 @@
             <a:fld id="{70C018FE-C8D6-4A9C-A702-41F1E0C1C452}" type="datetimeFigureOut">
               <a:rPr lang="en-IN" smtClean="0"/>
               <a:pPr/>
-              <a:t>03-12-2017</a:t>
+              <a:t>03/12/17</a:t>
             </a:fld>
             <a:endParaRPr lang="en-IN" dirty="0"/>
           </a:p>
@@ -2763,7 +2763,7 @@
             <a:fld id="{70C018FE-C8D6-4A9C-A702-41F1E0C1C452}" type="datetimeFigureOut">
               <a:rPr lang="en-IN" smtClean="0"/>
               <a:pPr/>
-              <a:t>03-12-2017</a:t>
+              <a:t>03/12/17</a:t>
             </a:fld>
             <a:endParaRPr lang="en-IN" dirty="0"/>
           </a:p>
@@ -2976,7 +2976,7 @@
             <a:fld id="{70C018FE-C8D6-4A9C-A702-41F1E0C1C452}" type="datetimeFigureOut">
               <a:rPr lang="en-IN" smtClean="0"/>
               <a:pPr/>
-              <a:t>03-12-2017</a:t>
+              <a:t>03/12/17</a:t>
             </a:fld>
             <a:endParaRPr lang="en-IN" dirty="0"/>
           </a:p>
@@ -3180,9 +3180,9 @@
           <a:solidFill>
             <a:schemeClr val="tx1"/>
           </a:solidFill>
-          <a:latin typeface="Times New Roman" panose="02020603050405020304" pitchFamily="18" charset="0"/>
-          <a:ea typeface="+mj-ea"/>
-          <a:cs typeface="Times New Roman" panose="02020603050405020304" pitchFamily="18" charset="0"/>
+          <a:latin typeface="+mn-lt"/>
+          <a:ea typeface="Comic Sans MS" charset="0"/>
+          <a:cs typeface="Comic Sans MS" charset="0"/>
         </a:defRPr>
       </a:lvl1pPr>
     </p:titleStyle>
@@ -3489,21 +3489,21 @@
           <a:lstStyle/>
           <a:p>
             <a:r>
-              <a:rPr lang="en-IN" sz="2800" dirty="0"/>
+              <a:rPr lang="en-IN" sz="4000" dirty="0"/>
               <a:t>INVESTMENT CASE STUDY </a:t>
             </a:r>
             <a:br>
-              <a:rPr lang="en-IN" sz="2800" dirty="0"/>
+              <a:rPr lang="en-IN" sz="4000" dirty="0"/>
             </a:br>
             <a:r>
-              <a:rPr lang="en-IN" sz="2800" dirty="0"/>
+              <a:rPr lang="en-IN" sz="4000" dirty="0"/>
               <a:t/>
             </a:r>
             <a:br>
-              <a:rPr lang="en-IN" sz="2800" dirty="0"/>
+              <a:rPr lang="en-IN" sz="4000" dirty="0"/>
             </a:br>
             <a:r>
-              <a:rPr lang="en-IN" sz="2800" dirty="0"/>
+              <a:rPr lang="en-IN" sz="4000" dirty="0"/>
               <a:t>SUBMISSION </a:t>
             </a:r>
           </a:p>
@@ -3533,13 +3533,26 @@
           <a:p>
             <a:pPr algn="l"/>
             <a:r>
-              <a:rPr lang="en-IN" sz="1200" dirty="0"/>
+              <a:rPr lang="en-IN" sz="1200" dirty="0" smtClean="0">
+                <a:latin typeface="+mj-lt"/>
+              </a:rPr>
               <a:t> </a:t>
             </a:r>
             <a:r>
-              <a:rPr lang="en-IN" sz="1800" dirty="0"/>
-              <a:t>Group Name:</a:t>
-            </a:r>
+              <a:rPr lang="en-IN" sz="1800" dirty="0" smtClean="0">
+                <a:latin typeface="+mj-lt"/>
+              </a:rPr>
+              <a:t>Team Members</a:t>
+            </a:r>
+            <a:r>
+              <a:rPr lang="en-IN" sz="1800" dirty="0" smtClean="0">
+                <a:latin typeface="+mj-lt"/>
+              </a:rPr>
+              <a:t>:</a:t>
+            </a:r>
+            <a:endParaRPr lang="en-IN" sz="1800" dirty="0">
+              <a:latin typeface="+mj-lt"/>
+            </a:endParaRPr>
           </a:p>
           <a:p>
             <a:pPr marL="457200" indent="-457200" algn="l">
@@ -3547,7 +3560,9 @@
               <a:buAutoNum type="arabicPeriod"/>
             </a:pPr>
             <a:r>
-              <a:rPr lang="en-IN" sz="1800" dirty="0"/>
+              <a:rPr lang="en-IN" sz="1800" dirty="0">
+                <a:latin typeface="+mj-lt"/>
+              </a:rPr>
               <a:t> Deepak Aneja</a:t>
             </a:r>
           </a:p>
@@ -3557,7 +3572,9 @@
               <a:buAutoNum type="arabicPeriod"/>
             </a:pPr>
             <a:r>
-              <a:rPr lang="en-IN" sz="1800" dirty="0"/>
+              <a:rPr lang="en-IN" sz="1800" dirty="0">
+                <a:latin typeface="+mj-lt"/>
+              </a:rPr>
               <a:t> Fayiz Mayamveettil</a:t>
             </a:r>
           </a:p>
@@ -3567,7 +3584,9 @@
               <a:buAutoNum type="arabicPeriod"/>
             </a:pPr>
             <a:r>
-              <a:rPr lang="en-IN" sz="1800" dirty="0"/>
+              <a:rPr lang="en-IN" sz="1800" dirty="0">
+                <a:latin typeface="+mj-lt"/>
+              </a:rPr>
               <a:t> Merin Jose</a:t>
             </a:r>
           </a:p>
@@ -3577,7 +3596,9 @@
               <a:buAutoNum type="arabicPeriod"/>
             </a:pPr>
             <a:r>
-              <a:rPr lang="en-IN" sz="1800" dirty="0"/>
+              <a:rPr lang="en-IN" sz="1800" dirty="0">
+                <a:latin typeface="+mj-lt"/>
+              </a:rPr>
               <a:t> Suresh Balla</a:t>
             </a:r>
           </a:p>
@@ -3586,7 +3607,9 @@
               <a:buFont typeface="+mj-lt"/>
               <a:buAutoNum type="arabicPeriod"/>
             </a:pPr>
-            <a:endParaRPr lang="en-IN" sz="1800" dirty="0"/>
+            <a:endParaRPr lang="en-IN" sz="1800" dirty="0">
+              <a:latin typeface="+mj-lt"/>
+            </a:endParaRPr>
           </a:p>
         </p:txBody>
       </p:sp>
@@ -3630,15 +3653,22 @@
             <p:ph idx="1"/>
           </p:nvPr>
         </p:nvSpPr>
-        <p:spPr/>
+        <p:spPr>
+          <a:xfrm>
+            <a:off x="393798" y="1877228"/>
+            <a:ext cx="11168742" cy="4344261"/>
+          </a:xfrm>
+        </p:spPr>
         <p:txBody>
           <a:bodyPr>
-            <a:normAutofit/>
+            <a:normAutofit fontScale="92500" lnSpcReduction="20000"/>
           </a:bodyPr>
           <a:lstStyle/>
           <a:p>
             <a:r>
-              <a:rPr lang="en-IN" dirty="0"/>
+              <a:rPr lang="en-IN" dirty="0">
+                <a:latin typeface="+mn-lt"/>
+              </a:rPr>
               <a:t>Spark Funds should invest in Ventures</a:t>
             </a:r>
           </a:p>
@@ -3646,11 +3676,15 @@
             <a:pPr marL="0" indent="0">
               <a:buNone/>
             </a:pPr>
-            <a:endParaRPr lang="en-IN" dirty="0"/>
-          </a:p>
-          <a:p>
-            <a:r>
-              <a:rPr lang="en-IN" dirty="0"/>
+            <a:endParaRPr lang="en-IN" sz="2000" dirty="0">
+              <a:latin typeface="+mn-lt"/>
+            </a:endParaRPr>
+          </a:p>
+          <a:p>
+            <a:r>
+              <a:rPr lang="en-IN" dirty="0">
+                <a:latin typeface="+mn-lt"/>
+              </a:rPr>
               <a:t>Highest Invested countries USA, UK or India should be Preferred</a:t>
             </a:r>
           </a:p>
@@ -3658,48 +3692,137 @@
             <a:pPr marL="0" indent="0">
               <a:buNone/>
             </a:pPr>
-            <a:endParaRPr lang="en-IN" dirty="0"/>
+            <a:endParaRPr lang="en-IN" sz="2000" dirty="0">
+              <a:latin typeface="+mn-lt"/>
+            </a:endParaRPr>
           </a:p>
           <a:p>
             <a:pPr fontAlgn="b"/>
             <a:r>
-              <a:rPr lang="en-IN" dirty="0"/>
+              <a:rPr lang="en-IN" dirty="0">
+                <a:latin typeface="+mn-lt"/>
+              </a:rPr>
               <a:t>“Others”, “</a:t>
             </a:r>
             <a:r>
-              <a:rPr lang="en-US" dirty="0"/>
+              <a:rPr lang="en-US" dirty="0">
+                <a:latin typeface="+mn-lt"/>
+              </a:rPr>
               <a:t>Social, Finance, Analytics, Advertising” are </a:t>
             </a:r>
             <a:r>
-              <a:rPr lang="en-US" dirty="0" smtClean="0"/>
+              <a:rPr lang="en-US" dirty="0" smtClean="0">
+                <a:latin typeface="+mn-lt"/>
+              </a:rPr>
               <a:t>top 2 preferred </a:t>
             </a:r>
             <a:r>
-              <a:rPr lang="en-US" dirty="0"/>
+              <a:rPr lang="en-US" dirty="0">
+                <a:latin typeface="+mn-lt"/>
+              </a:rPr>
               <a:t>sector for all </a:t>
             </a:r>
             <a:r>
-              <a:rPr lang="en-US" dirty="0" smtClean="0"/>
+              <a:rPr lang="en-US" dirty="0" smtClean="0">
+                <a:latin typeface="+mn-lt"/>
+              </a:rPr>
               <a:t>these three </a:t>
             </a:r>
             <a:r>
-              <a:rPr lang="en-US" dirty="0"/>
-              <a:t>countries.</a:t>
-            </a:r>
+              <a:rPr lang="en-US" dirty="0" smtClean="0">
+                <a:latin typeface="+mn-lt"/>
+              </a:rPr>
+              <a:t>countries</a:t>
+            </a:r>
+          </a:p>
+          <a:p>
+            <a:pPr lvl="1" fontAlgn="b"/>
+            <a:r>
+              <a:rPr lang="en-US" sz="2200" dirty="0" smtClean="0">
+                <a:latin typeface="+mn-lt"/>
+              </a:rPr>
+              <a:t>Within others main sectors, below are top 2 primary sectors which can be considered for investment</a:t>
+            </a:r>
+          </a:p>
+          <a:p>
+            <a:pPr lvl="2" fontAlgn="b"/>
+            <a:r>
+              <a:rPr lang="en-US" sz="1200" dirty="0" smtClean="0">
+                <a:latin typeface="+mn-lt"/>
+              </a:rPr>
+              <a:t>software and </a:t>
+            </a:r>
+            <a:r>
+              <a:rPr lang="en-US" sz="1200" dirty="0">
+                <a:latin typeface="+mn-lt"/>
+              </a:rPr>
+              <a:t>enterprise </a:t>
+            </a:r>
+            <a:r>
+              <a:rPr lang="en-US" sz="1200" dirty="0" smtClean="0">
+                <a:latin typeface="+mn-lt"/>
+              </a:rPr>
+              <a:t>software for USA</a:t>
+            </a:r>
+          </a:p>
+          <a:p>
+            <a:pPr lvl="2" fontAlgn="b"/>
+            <a:r>
+              <a:rPr lang="en-US" sz="1200" dirty="0" smtClean="0">
+                <a:latin typeface="+mn-lt"/>
+              </a:rPr>
+              <a:t>software and e-commerce </a:t>
+            </a:r>
+            <a:r>
+              <a:rPr lang="en-US" sz="1200" dirty="0">
+                <a:latin typeface="+mn-lt"/>
+              </a:rPr>
+              <a:t>for </a:t>
+            </a:r>
+            <a:r>
+              <a:rPr lang="en-US" sz="1200" dirty="0">
+                <a:latin typeface="+mn-lt"/>
+              </a:rPr>
+              <a:t>United Kingdom of Great Britain and Northern </a:t>
+            </a:r>
+            <a:r>
+              <a:rPr lang="en-US" sz="1200" dirty="0" smtClean="0">
+                <a:latin typeface="+mn-lt"/>
+              </a:rPr>
+              <a:t>Ireland</a:t>
+            </a:r>
+          </a:p>
+          <a:p>
+            <a:pPr lvl="2" fontAlgn="b"/>
+            <a:r>
+              <a:rPr lang="en-US" sz="1200" dirty="0" smtClean="0">
+                <a:latin typeface="+mn-lt"/>
+              </a:rPr>
+              <a:t>e-commerce and software for India</a:t>
+            </a:r>
+            <a:endParaRPr lang="en-US" sz="1200" dirty="0">
+              <a:latin typeface="+mn-lt"/>
+            </a:endParaRPr>
           </a:p>
           <a:p>
             <a:pPr marL="0" indent="0" fontAlgn="b">
               <a:buNone/>
             </a:pPr>
-            <a:endParaRPr lang="en-US" dirty="0"/>
-          </a:p>
-          <a:p>
-            <a:r>
-              <a:rPr lang="en-US" dirty="0"/>
+            <a:endParaRPr lang="en-US" sz="2000" dirty="0">
+              <a:latin typeface="+mn-lt"/>
+            </a:endParaRPr>
+          </a:p>
+          <a:p>
+            <a:r>
+              <a:rPr lang="en-US" dirty="0">
+                <a:latin typeface="+mn-lt"/>
+              </a:rPr>
               <a:t>“Cleantech / Semiconductors</a:t>
             </a:r>
             <a:r>
-              <a:rPr lang="en-IN" dirty="0"/>
+              <a:rPr lang="en-IN" dirty="0">
+                <a:latin typeface="+mn-lt"/>
+              </a:rPr>
               <a:t>” are 3rd preferred sector for US and UK and for India 3rd Preferred sector is “News, Search and Messaging”</a:t>
             </a:r>
           </a:p>
@@ -3707,7 +3830,9 @@
             <a:pPr marL="0" indent="0">
               <a:buNone/>
             </a:pPr>
-            <a:endParaRPr lang="en-IN" dirty="0"/>
+            <a:endParaRPr lang="en-IN" sz="2000" dirty="0">
+              <a:latin typeface="+mn-lt"/>
+            </a:endParaRPr>
           </a:p>
         </p:txBody>
       </p:sp>
@@ -3799,14 +3924,14 @@
             </a:pPr>
             <a:r>
               <a:rPr lang="en-IN" dirty="0">
-                <a:latin typeface="Arial" pitchFamily="34" charset="0"/>
+                <a:latin typeface="+mn-lt"/>
                 <a:cs typeface="Arial" pitchFamily="34" charset="0"/>
               </a:rPr>
               <a:t>     </a:t>
             </a:r>
             <a:r>
               <a:rPr lang="en-IN" b="1" dirty="0">
-                <a:latin typeface="Arial" pitchFamily="34" charset="0"/>
+                <a:latin typeface="+mn-lt"/>
                 <a:cs typeface="Arial" pitchFamily="34" charset="0"/>
               </a:rPr>
               <a:t>Business Scenario</a:t>
@@ -3817,7 +3942,7 @@
               <a:buNone/>
             </a:pPr>
             <a:endParaRPr lang="en-IN" sz="2800" dirty="0">
-              <a:latin typeface="Arial" pitchFamily="34" charset="0"/>
+              <a:latin typeface="+mn-lt"/>
               <a:cs typeface="Arial" pitchFamily="34" charset="0"/>
             </a:endParaRPr>
           </a:p>
@@ -3827,7 +3952,7 @@
             </a:pPr>
             <a:r>
               <a:rPr lang="en-IN" sz="2800" dirty="0">
-                <a:latin typeface="Arial" pitchFamily="34" charset="0"/>
+                <a:latin typeface="+mn-lt"/>
                 <a:cs typeface="Arial" pitchFamily="34" charset="0"/>
               </a:rPr>
               <a:t>Spark Funds has a budget of 5 to 15million USD to be invested in a few companies which are based out of an English speaking country.</a:t>
@@ -3839,7 +3964,7 @@
             </a:pPr>
             <a:r>
               <a:rPr lang="en-IN" sz="2800" dirty="0">
-                <a:latin typeface="Arial" pitchFamily="34" charset="0"/>
+                <a:latin typeface="+mn-lt"/>
                 <a:cs typeface="Arial" pitchFamily="34" charset="0"/>
               </a:rPr>
               <a:t> </a:t>
@@ -3851,13 +3976,13 @@
             </a:pPr>
             <a:r>
               <a:rPr lang="en-US" sz="2800" dirty="0">
-                <a:latin typeface="Arial" pitchFamily="34" charset="0"/>
+                <a:latin typeface="+mn-lt"/>
                 <a:cs typeface="Arial" pitchFamily="34" charset="0"/>
               </a:rPr>
               <a:t>The overall strategy is to invest where others are investing, implying that the best sectors and countries are the ones where most investments are happening.</a:t>
             </a:r>
             <a:endParaRPr lang="en-IN" sz="2800" dirty="0">
-              <a:latin typeface="Arial" pitchFamily="34" charset="0"/>
+              <a:latin typeface="+mn-lt"/>
               <a:cs typeface="Arial" pitchFamily="34" charset="0"/>
             </a:endParaRPr>
           </a:p>
@@ -3866,7 +3991,7 @@
               <a:buNone/>
             </a:pPr>
             <a:endParaRPr lang="en-IN" sz="3200" dirty="0">
-              <a:latin typeface="Arial" pitchFamily="34" charset="0"/>
+              <a:latin typeface="+mn-lt"/>
               <a:cs typeface="Arial" pitchFamily="34" charset="0"/>
             </a:endParaRPr>
           </a:p>
@@ -3875,7 +4000,7 @@
               <a:buNone/>
             </a:pPr>
             <a:endParaRPr lang="en-IN" sz="3200" dirty="0">
-              <a:latin typeface="Arial" pitchFamily="34" charset="0"/>
+              <a:latin typeface="+mn-lt"/>
               <a:cs typeface="Arial" pitchFamily="34" charset="0"/>
             </a:endParaRPr>
           </a:p>
@@ -4541,7 +4666,7 @@
           <p:cNvPr id="6" name="Rectangle 1">
             <a:extLst>
               <a:ext uri="{FF2B5EF4-FFF2-40B4-BE49-F238E27FC236}">
-                <a16:creationId xmlns:a16="http://schemas.microsoft.com/office/drawing/2014/main" id="{B1C30C8B-AE54-4BA8-B331-4BBA34C66118}"/>
+                <a16:creationId xmlns:a16="http://schemas.microsoft.com/office/drawing/2014/main" xmlns="" id="{B1C30C8B-AE54-4BA8-B331-4BBA34C66118}"/>
               </a:ext>
             </a:extLst>
           </p:cNvPr>
@@ -4664,7 +4789,7 @@
           <p:cNvPr id="20" name="Oval 19">
             <a:extLst>
               <a:ext uri="{FF2B5EF4-FFF2-40B4-BE49-F238E27FC236}">
-                <a16:creationId xmlns:a16="http://schemas.microsoft.com/office/drawing/2014/main" id="{01342C0C-7335-481B-8740-C3D31BC3B6DA}"/>
+                <a16:creationId xmlns:a16="http://schemas.microsoft.com/office/drawing/2014/main" xmlns="" id="{01342C0C-7335-481B-8740-C3D31BC3B6DA}"/>
               </a:ext>
             </a:extLst>
           </p:cNvPr>
@@ -4716,7 +4841,7 @@
           <p:cNvPr id="21" name="Straight Arrow Connector 20">
             <a:extLst>
               <a:ext uri="{FF2B5EF4-FFF2-40B4-BE49-F238E27FC236}">
-                <a16:creationId xmlns:a16="http://schemas.microsoft.com/office/drawing/2014/main" id="{E4AFD639-B410-4613-B678-B7CBBF2C68F3}"/>
+                <a16:creationId xmlns:a16="http://schemas.microsoft.com/office/drawing/2014/main" xmlns="" id="{E4AFD639-B410-4613-B678-B7CBBF2C68F3}"/>
               </a:ext>
             </a:extLst>
           </p:cNvPr>
@@ -4757,7 +4882,7 @@
           <p:cNvPr id="23" name="Oval 22">
             <a:extLst>
               <a:ext uri="{FF2B5EF4-FFF2-40B4-BE49-F238E27FC236}">
-                <a16:creationId xmlns:a16="http://schemas.microsoft.com/office/drawing/2014/main" id="{329E82EC-5370-4DBC-9CFA-A30A9DBF3B4F}"/>
+                <a16:creationId xmlns:a16="http://schemas.microsoft.com/office/drawing/2014/main" xmlns="" id="{329E82EC-5370-4DBC-9CFA-A30A9DBF3B4F}"/>
               </a:ext>
             </a:extLst>
           </p:cNvPr>
@@ -4809,7 +4934,7 @@
           <p:cNvPr id="24" name="Straight Arrow Connector 23">
             <a:extLst>
               <a:ext uri="{FF2B5EF4-FFF2-40B4-BE49-F238E27FC236}">
-                <a16:creationId xmlns:a16="http://schemas.microsoft.com/office/drawing/2014/main" id="{7C0CDAD9-5AFD-42DD-BEC0-A5BD58EF1AF3}"/>
+                <a16:creationId xmlns:a16="http://schemas.microsoft.com/office/drawing/2014/main" xmlns="" id="{7C0CDAD9-5AFD-42DD-BEC0-A5BD58EF1AF3}"/>
               </a:ext>
             </a:extLst>
           </p:cNvPr>
@@ -4850,7 +4975,7 @@
           <p:cNvPr id="27" name="Straight Arrow Connector 26">
             <a:extLst>
               <a:ext uri="{FF2B5EF4-FFF2-40B4-BE49-F238E27FC236}">
-                <a16:creationId xmlns:a16="http://schemas.microsoft.com/office/drawing/2014/main" id="{FCD4D9FA-FFBF-4A79-A275-D5222A9F7EFE}"/>
+                <a16:creationId xmlns:a16="http://schemas.microsoft.com/office/drawing/2014/main" xmlns="" id="{FCD4D9FA-FFBF-4A79-A275-D5222A9F7EFE}"/>
               </a:ext>
             </a:extLst>
           </p:cNvPr>
@@ -4891,7 +5016,7 @@
           <p:cNvPr id="28" name="Straight Arrow Connector 27">
             <a:extLst>
               <a:ext uri="{FF2B5EF4-FFF2-40B4-BE49-F238E27FC236}">
-                <a16:creationId xmlns:a16="http://schemas.microsoft.com/office/drawing/2014/main" id="{9D4D8D37-7C88-45C6-9032-F77BFF0754F6}"/>
+                <a16:creationId xmlns:a16="http://schemas.microsoft.com/office/drawing/2014/main" xmlns="" id="{9D4D8D37-7C88-45C6-9032-F77BFF0754F6}"/>
               </a:ext>
             </a:extLst>
           </p:cNvPr>
@@ -4999,34 +5124,30 @@
         </p:spPr>
         <p:txBody>
           <a:bodyPr>
-            <a:normAutofit lnSpcReduction="10000"/>
+            <a:normAutofit fontScale="92500" lnSpcReduction="10000"/>
           </a:bodyPr>
           <a:lstStyle/>
           <a:p>
             <a:r>
               <a:rPr lang="en-IN" sz="2000" dirty="0">
-                <a:latin typeface="Arial" pitchFamily="34" charset="0"/>
+                <a:latin typeface="+mn-lt"/>
                 <a:cs typeface="Arial" pitchFamily="34" charset="0"/>
               </a:rPr>
               <a:t>Average overall Funding in select Investment types</a:t>
             </a:r>
-            <a:endParaRPr lang="en-IN" sz="2000" dirty="0">
-              <a:latin typeface="Arial" pitchFamily="34" charset="0"/>
-              <a:cs typeface="Arial" pitchFamily="34" charset="0"/>
-            </a:endParaRPr>
           </a:p>
           <a:p>
             <a:pPr marL="0" indent="0">
               <a:buNone/>
             </a:pPr>
             <a:endParaRPr lang="en-IN" sz="2000" dirty="0">
-              <a:latin typeface="Arial" pitchFamily="34" charset="0"/>
+              <a:latin typeface="+mn-lt"/>
               <a:cs typeface="Arial" pitchFamily="34" charset="0"/>
             </a:endParaRPr>
           </a:p>
           <a:p>
             <a:endParaRPr lang="en-IN" sz="2000" dirty="0">
-              <a:latin typeface="Arial" pitchFamily="34" charset="0"/>
+              <a:latin typeface="+mn-lt"/>
               <a:cs typeface="Arial" pitchFamily="34" charset="0"/>
             </a:endParaRPr>
           </a:p>
@@ -5035,7 +5156,7 @@
               <a:buNone/>
             </a:pPr>
             <a:endParaRPr lang="en-IN" sz="2000" dirty="0">
-              <a:latin typeface="Arial" pitchFamily="34" charset="0"/>
+              <a:latin typeface="+mn-lt"/>
               <a:cs typeface="Arial" pitchFamily="34" charset="0"/>
             </a:endParaRPr>
           </a:p>
@@ -5044,26 +5165,86 @@
               <a:buNone/>
             </a:pPr>
             <a:endParaRPr lang="en-IN" sz="2000" dirty="0">
-              <a:latin typeface="Arial" pitchFamily="34" charset="0"/>
+              <a:latin typeface="+mn-lt"/>
               <a:cs typeface="Arial" pitchFamily="34" charset="0"/>
             </a:endParaRPr>
           </a:p>
           <a:p>
             <a:endParaRPr lang="en-IN" sz="2000" dirty="0" smtClean="0">
-              <a:latin typeface="Arial" pitchFamily="34" charset="0"/>
+              <a:latin typeface="+mn-lt"/>
               <a:cs typeface="Arial" pitchFamily="34" charset="0"/>
             </a:endParaRPr>
           </a:p>
           <a:p>
             <a:endParaRPr lang="en-IN" sz="2000" dirty="0">
-              <a:latin typeface="Arial" pitchFamily="34" charset="0"/>
+              <a:latin typeface="+mn-lt"/>
               <a:cs typeface="Arial" pitchFamily="34" charset="0"/>
             </a:endParaRPr>
           </a:p>
           <a:p>
+            <a:endParaRPr lang="en-IN" sz="2000" dirty="0" smtClean="0">
+              <a:latin typeface="+mn-lt"/>
+              <a:cs typeface="Arial" pitchFamily="34" charset="0"/>
+            </a:endParaRPr>
+          </a:p>
+          <a:p>
             <a:r>
               <a:rPr lang="en-IN" sz="2000" dirty="0" smtClean="0">
-                <a:latin typeface="Arial" pitchFamily="34" charset="0"/>
+                <a:latin typeface="+mn-lt"/>
+                <a:cs typeface="Arial" pitchFamily="34" charset="0"/>
+              </a:rPr>
+              <a:t>Preferred </a:t>
+            </a:r>
+            <a:r>
+              <a:rPr lang="en-IN" sz="2000" dirty="0">
+                <a:latin typeface="+mn-lt"/>
+                <a:cs typeface="Arial" pitchFamily="34" charset="0"/>
+              </a:rPr>
+              <a:t>Investment Type: </a:t>
+            </a:r>
+            <a:r>
+              <a:rPr lang="en-IN" sz="2000" dirty="0" smtClean="0">
+                <a:latin typeface="+mn-lt"/>
+                <a:cs typeface="Arial" pitchFamily="34" charset="0"/>
+              </a:rPr>
+              <a:t>Criteria – Basis Overall Average funding between 5 – 15 M </a:t>
+            </a:r>
+            <a:endParaRPr lang="en-IN" sz="2000" dirty="0">
+              <a:latin typeface="+mn-lt"/>
+              <a:cs typeface="Arial" pitchFamily="34" charset="0"/>
+            </a:endParaRPr>
+          </a:p>
+          <a:p>
+            <a:r>
+              <a:rPr lang="en-US" sz="2000" dirty="0">
+                <a:latin typeface="+mn-lt"/>
+                <a:cs typeface="Arial" panose="020B0604020202020204" pitchFamily="34" charset="0"/>
+              </a:rPr>
+              <a:t>Results/ Recommendation </a:t>
+            </a:r>
+            <a:endParaRPr lang="en-US" sz="2000" dirty="0" smtClean="0">
+              <a:latin typeface="+mn-lt"/>
+              <a:cs typeface="Arial" panose="020B0604020202020204" pitchFamily="34" charset="0"/>
+            </a:endParaRPr>
+          </a:p>
+          <a:p>
+            <a:pPr lvl="1"/>
+            <a:r>
+              <a:rPr lang="en-IN" sz="1600" dirty="0" smtClean="0">
+                <a:latin typeface="+mn-lt"/>
+                <a:cs typeface="Arial" pitchFamily="34" charset="0"/>
+              </a:rPr>
+              <a:t>Only Ventures has average investment  within 5 – 15 M and so is preferred funding type</a:t>
+            </a:r>
+            <a:endParaRPr lang="en-IN" sz="1600" dirty="0">
+              <a:latin typeface="+mn-lt"/>
+              <a:cs typeface="Arial" pitchFamily="34" charset="0"/>
+            </a:endParaRPr>
+          </a:p>
+          <a:p>
+            <a:r>
+              <a:rPr lang="en-IN" sz="2000" dirty="0">
+                <a:latin typeface="+mn-lt"/>
                 <a:cs typeface="Arial" pitchFamily="34" charset="0"/>
               </a:rPr>
               <a:t>Other Observations</a:t>
@@ -5072,88 +5253,45 @@
           <a:p>
             <a:pPr lvl="1"/>
             <a:r>
-              <a:rPr lang="en-IN" sz="1600" dirty="0" smtClean="0">
-                <a:latin typeface="Arial" pitchFamily="34" charset="0"/>
+              <a:rPr lang="en-IN" sz="1600" dirty="0">
+                <a:latin typeface="+mn-lt"/>
                 <a:cs typeface="Arial" pitchFamily="34" charset="0"/>
               </a:rPr>
-              <a:t>59.60</a:t>
-            </a:r>
+              <a:t>59.60% of the total amount invested globally is on Venture Type Investment</a:t>
+            </a:r>
+          </a:p>
+          <a:p>
+            <a:pPr lvl="1"/>
             <a:r>
               <a:rPr lang="en-IN" sz="1600" dirty="0">
-                <a:latin typeface="Arial" pitchFamily="34" charset="0"/>
+                <a:latin typeface="+mn-lt"/>
                 <a:cs typeface="Arial" pitchFamily="34" charset="0"/>
               </a:rPr>
-              <a:t>% of the total amount invested globally is on Venture Type Investment</a:t>
-            </a:r>
-          </a:p>
-          <a:p>
-            <a:pPr lvl="1"/>
-            <a:r>
-              <a:rPr lang="en-IN" sz="1600" dirty="0">
-                <a:latin typeface="Arial" pitchFamily="34" charset="0"/>
+              <a:t>On slicing further on Angel, Seed, private equity and Venture, </a:t>
+            </a:r>
+            <a:r>
+              <a:rPr lang="en-IN" sz="1600" dirty="0" smtClean="0">
+                <a:latin typeface="+mn-lt"/>
                 <a:cs typeface="Arial" pitchFamily="34" charset="0"/>
               </a:rPr>
-              <a:t>On slicing further on Angel, Seed, private equity and Venture, 78.38% out of these four are of Venture types</a:t>
+              <a:t>78.30% </a:t>
+            </a:r>
+            <a:r>
+              <a:rPr lang="en-IN" sz="1600" dirty="0">
+                <a:latin typeface="+mn-lt"/>
+                <a:cs typeface="Arial" pitchFamily="34" charset="0"/>
+              </a:rPr>
+              <a:t>out of these four are of Venture types</a:t>
             </a:r>
             <a:r>
               <a:rPr lang="en-IN" sz="1600" dirty="0" smtClean="0">
-                <a:latin typeface="Arial" pitchFamily="34" charset="0"/>
+                <a:latin typeface="+mn-lt"/>
                 <a:cs typeface="Arial" pitchFamily="34" charset="0"/>
               </a:rPr>
               <a:t>.</a:t>
             </a:r>
-          </a:p>
-          <a:p>
-            <a:r>
-              <a:rPr lang="en-IN" sz="2000" dirty="0">
-                <a:latin typeface="Arial" pitchFamily="34" charset="0"/>
-                <a:cs typeface="Arial" pitchFamily="34" charset="0"/>
-              </a:rPr>
-              <a:t>Preferred Investment Type: </a:t>
-            </a:r>
-            <a:r>
-              <a:rPr lang="en-IN" sz="2000" dirty="0" smtClean="0">
-                <a:latin typeface="Arial" pitchFamily="34" charset="0"/>
-                <a:cs typeface="Arial" pitchFamily="34" charset="0"/>
-              </a:rPr>
-              <a:t>Criteria </a:t>
-            </a:r>
-            <a:r>
-              <a:rPr lang="en-IN" sz="2000" dirty="0" smtClean="0">
-                <a:latin typeface="Arial" pitchFamily="34" charset="0"/>
-                <a:cs typeface="Arial" pitchFamily="34" charset="0"/>
-              </a:rPr>
-              <a:t>– Basis Overall Average funding between 5 – 15 M </a:t>
-            </a:r>
             <a:endParaRPr lang="en-IN" sz="2000" dirty="0">
-              <a:latin typeface="Arial" pitchFamily="34" charset="0"/>
-              <a:cs typeface="Arial" pitchFamily="34" charset="0"/>
-            </a:endParaRPr>
-          </a:p>
-          <a:p>
-            <a:r>
-              <a:rPr lang="en-US" sz="2000" dirty="0">
-                <a:latin typeface="Arial" panose="020B0604020202020204" pitchFamily="34" charset="0"/>
-                <a:cs typeface="Arial" panose="020B0604020202020204" pitchFamily="34" charset="0"/>
-              </a:rPr>
-              <a:t>Results/ Recommendation </a:t>
-            </a:r>
-            <a:endParaRPr lang="en-US" sz="2000" dirty="0" smtClean="0">
-              <a:latin typeface="Arial" panose="020B0604020202020204" pitchFamily="34" charset="0"/>
-              <a:cs typeface="Arial" panose="020B0604020202020204" pitchFamily="34" charset="0"/>
-            </a:endParaRPr>
-          </a:p>
-          <a:p>
-            <a:pPr lvl="1"/>
-            <a:r>
-              <a:rPr lang="en-IN" sz="1600" dirty="0" smtClean="0">
-                <a:latin typeface="Arial" pitchFamily="34" charset="0"/>
-                <a:cs typeface="Arial" pitchFamily="34" charset="0"/>
-              </a:rPr>
-              <a:t>Only Ventures has average investment  within 5 – 15 M and so is preferred funding type</a:t>
-            </a:r>
-            <a:endParaRPr lang="en-IN" sz="1600" dirty="0">
-              <a:latin typeface="Arial" pitchFamily="34" charset="0"/>
+              <a:latin typeface="+mn-lt"/>
               <a:cs typeface="Arial" pitchFamily="34" charset="0"/>
             </a:endParaRPr>
           </a:p>
@@ -5162,16 +5300,7 @@
               <a:buNone/>
             </a:pPr>
             <a:endParaRPr lang="en-IN" sz="2000" dirty="0">
-              <a:latin typeface="Arial" pitchFamily="34" charset="0"/>
-              <a:cs typeface="Arial" pitchFamily="34" charset="0"/>
-            </a:endParaRPr>
-          </a:p>
-          <a:p>
-            <a:pPr marL="0" indent="0">
-              <a:buNone/>
-            </a:pPr>
-            <a:endParaRPr lang="en-IN" sz="2000" dirty="0">
-              <a:latin typeface="Arial" pitchFamily="34" charset="0"/>
+              <a:latin typeface="+mn-lt"/>
               <a:cs typeface="Arial" pitchFamily="34" charset="0"/>
             </a:endParaRPr>
           </a:p>
@@ -5203,14 +5332,14 @@
                 <a:gridCol w="1802220">
                   <a:extLst>
                     <a:ext uri="{9D8B030D-6E8A-4147-A177-3AD203B41FA5}">
-                      <a16:colId xmlns:a16="http://schemas.microsoft.com/office/drawing/2014/main" val="868097481"/>
+                      <a16:colId xmlns:a16="http://schemas.microsoft.com/office/drawing/2014/main" xmlns="" val="868097481"/>
                     </a:ext>
                   </a:extLst>
                 </a:gridCol>
                 <a:gridCol w="2524120">
                   <a:extLst>
                     <a:ext uri="{9D8B030D-6E8A-4147-A177-3AD203B41FA5}">
-                      <a16:colId xmlns:a16="http://schemas.microsoft.com/office/drawing/2014/main" val="3709009668"/>
+                      <a16:colId xmlns:a16="http://schemas.microsoft.com/office/drawing/2014/main" xmlns="" val="3709009668"/>
                     </a:ext>
                   </a:extLst>
                 </a:gridCol>
@@ -5353,7 +5482,7 @@
                 </a:tc>
                 <a:extLst>
                   <a:ext uri="{0D108BD9-81ED-4DB2-BD59-A6C34878D82A}">
-                    <a16:rowId xmlns:a16="http://schemas.microsoft.com/office/drawing/2014/main" val="2757710889"/>
+                    <a16:rowId xmlns:a16="http://schemas.microsoft.com/office/drawing/2014/main" xmlns="" val="2757710889"/>
                   </a:ext>
                 </a:extLst>
               </a:tr>
@@ -5475,7 +5604,7 @@
                 </a:tc>
                 <a:extLst>
                   <a:ext uri="{0D108BD9-81ED-4DB2-BD59-A6C34878D82A}">
-                    <a16:rowId xmlns:a16="http://schemas.microsoft.com/office/drawing/2014/main" val="2658333791"/>
+                    <a16:rowId xmlns:a16="http://schemas.microsoft.com/office/drawing/2014/main" xmlns="" val="2658333791"/>
                   </a:ext>
                 </a:extLst>
               </a:tr>
@@ -5591,7 +5720,7 @@
                 </a:tc>
                 <a:extLst>
                   <a:ext uri="{0D108BD9-81ED-4DB2-BD59-A6C34878D82A}">
-                    <a16:rowId xmlns:a16="http://schemas.microsoft.com/office/drawing/2014/main" val="3827248635"/>
+                    <a16:rowId xmlns:a16="http://schemas.microsoft.com/office/drawing/2014/main" xmlns="" val="3827248635"/>
                   </a:ext>
                 </a:extLst>
               </a:tr>
@@ -5713,7 +5842,7 @@
                 </a:tc>
                 <a:extLst>
                   <a:ext uri="{0D108BD9-81ED-4DB2-BD59-A6C34878D82A}">
-                    <a16:rowId xmlns:a16="http://schemas.microsoft.com/office/drawing/2014/main" val="3945297251"/>
+                    <a16:rowId xmlns:a16="http://schemas.microsoft.com/office/drawing/2014/main" xmlns="" val="3945297251"/>
                   </a:ext>
                 </a:extLst>
               </a:tr>
@@ -5829,7 +5958,7 @@
                 </a:tc>
                 <a:extLst>
                   <a:ext uri="{0D108BD9-81ED-4DB2-BD59-A6C34878D82A}">
-                    <a16:rowId xmlns:a16="http://schemas.microsoft.com/office/drawing/2014/main" val="3650595121"/>
+                    <a16:rowId xmlns:a16="http://schemas.microsoft.com/office/drawing/2014/main" xmlns="" val="3650595121"/>
                   </a:ext>
                 </a:extLst>
               </a:tr>
@@ -5915,13 +6044,13 @@
           <a:p>
             <a:r>
               <a:rPr lang="en-IN" sz="2000" dirty="0" smtClean="0">
-                <a:latin typeface="Arial" panose="020B0604020202020204" pitchFamily="34" charset="0"/>
+                <a:latin typeface="+mn-lt"/>
                 <a:cs typeface="Arial" panose="020B0604020202020204" pitchFamily="34" charset="0"/>
               </a:rPr>
               <a:t>Main criteria</a:t>
             </a:r>
             <a:endParaRPr lang="en-IN" sz="2000" dirty="0">
-              <a:latin typeface="Arial" panose="020B0604020202020204" pitchFamily="34" charset="0"/>
+              <a:latin typeface="+mn-lt"/>
               <a:cs typeface="Arial" panose="020B0604020202020204" pitchFamily="34" charset="0"/>
             </a:endParaRPr>
           </a:p>
@@ -5929,7 +6058,7 @@
             <a:pPr lvl="1"/>
             <a:r>
               <a:rPr lang="en-IN" sz="2000" dirty="0">
-                <a:latin typeface="Arial" panose="020B0604020202020204" pitchFamily="34" charset="0"/>
+                <a:latin typeface="+mn-lt"/>
                 <a:cs typeface="Arial" panose="020B0604020202020204" pitchFamily="34" charset="0"/>
               </a:rPr>
               <a:t>Invest in one of the most heavily invested countries</a:t>
@@ -5939,7 +6068,7 @@
             <a:pPr lvl="1"/>
             <a:r>
               <a:rPr lang="en-IN" sz="2000" dirty="0">
-                <a:latin typeface="Arial" panose="020B0604020202020204" pitchFamily="34" charset="0"/>
+                <a:latin typeface="+mn-lt"/>
                 <a:cs typeface="Arial" panose="020B0604020202020204" pitchFamily="34" charset="0"/>
               </a:rPr>
               <a:t>Invest in an English speaking country</a:t>
@@ -5950,20 +6079,20 @@
               <a:buNone/>
             </a:pPr>
             <a:endParaRPr lang="en-IN" sz="2000" dirty="0">
-              <a:latin typeface="Arial" panose="020B0604020202020204" pitchFamily="34" charset="0"/>
+              <a:latin typeface="+mn-lt"/>
               <a:cs typeface="Arial" panose="020B0604020202020204" pitchFamily="34" charset="0"/>
             </a:endParaRPr>
           </a:p>
           <a:p>
             <a:r>
               <a:rPr lang="en-US" sz="2000" dirty="0">
-                <a:latin typeface="Arial" panose="020B0604020202020204" pitchFamily="34" charset="0"/>
+                <a:latin typeface="+mn-lt"/>
                 <a:cs typeface="Arial" panose="020B0604020202020204" pitchFamily="34" charset="0"/>
               </a:rPr>
               <a:t>Results/ Recommendation</a:t>
             </a:r>
             <a:endParaRPr lang="en-IN" sz="2000" dirty="0">
-              <a:latin typeface="Arial" panose="020B0604020202020204" pitchFamily="34" charset="0"/>
+              <a:latin typeface="+mn-lt"/>
               <a:cs typeface="Arial" panose="020B0604020202020204" pitchFamily="34" charset="0"/>
             </a:endParaRPr>
           </a:p>
@@ -5974,7 +6103,7 @@
             </a:pPr>
             <a:r>
               <a:rPr lang="en-IN" sz="2000" dirty="0">
-                <a:latin typeface="Arial" panose="020B0604020202020204" pitchFamily="34" charset="0"/>
+                <a:latin typeface="+mn-lt"/>
                 <a:cs typeface="Arial" panose="020B0604020202020204" pitchFamily="34" charset="0"/>
               </a:rPr>
               <a:t>United States of America</a:t>
@@ -5987,7 +6116,7 @@
             </a:pPr>
             <a:r>
               <a:rPr lang="en-IN" sz="2000" dirty="0">
-                <a:latin typeface="Arial" panose="020B0604020202020204" pitchFamily="34" charset="0"/>
+                <a:latin typeface="+mn-lt"/>
                 <a:cs typeface="Arial" panose="020B0604020202020204" pitchFamily="34" charset="0"/>
               </a:rPr>
               <a:t>United Kingdom of Great Britain and Northern Ireland</a:t>
@@ -6000,7 +6129,7 @@
             </a:pPr>
             <a:r>
               <a:rPr lang="en-IN" sz="2000" dirty="0">
-                <a:latin typeface="Arial" panose="020B0604020202020204" pitchFamily="34" charset="0"/>
+                <a:latin typeface="+mn-lt"/>
                 <a:cs typeface="Arial" panose="020B0604020202020204" pitchFamily="34" charset="0"/>
               </a:rPr>
               <a:t>India</a:t>
@@ -6009,14 +6138,14 @@
           <a:p>
             <a:pPr lvl="1"/>
             <a:endParaRPr lang="en-IN" sz="2000" dirty="0">
-              <a:latin typeface="Arial" panose="020B0604020202020204" pitchFamily="34" charset="0"/>
+              <a:latin typeface="+mn-lt"/>
               <a:cs typeface="Arial" panose="020B0604020202020204" pitchFamily="34" charset="0"/>
             </a:endParaRPr>
           </a:p>
           <a:p>
             <a:pPr lvl="1"/>
             <a:endParaRPr lang="en-IN" sz="2000" dirty="0">
-              <a:latin typeface="Arial" panose="020B0604020202020204" pitchFamily="34" charset="0"/>
+              <a:latin typeface="+mn-lt"/>
               <a:cs typeface="Arial" panose="020B0604020202020204" pitchFamily="34" charset="0"/>
             </a:endParaRPr>
           </a:p>
@@ -6025,7 +6154,7 @@
               <a:buNone/>
             </a:pPr>
             <a:endParaRPr lang="en-IN" sz="2000" dirty="0">
-              <a:latin typeface="Arial" panose="020B0604020202020204" pitchFamily="34" charset="0"/>
+              <a:latin typeface="+mn-lt"/>
               <a:cs typeface="Arial" panose="020B0604020202020204" pitchFamily="34" charset="0"/>
             </a:endParaRPr>
           </a:p>
@@ -6035,14 +6164,14 @@
             </a:pPr>
             <a:r>
               <a:rPr lang="en-IN" sz="2000" dirty="0">
-                <a:latin typeface="Arial" panose="020B0604020202020204" pitchFamily="34" charset="0"/>
+                <a:latin typeface="+mn-lt"/>
                 <a:cs typeface="Arial" panose="020B0604020202020204" pitchFamily="34" charset="0"/>
               </a:rPr>
               <a:t>    *</a:t>
             </a:r>
             <a:r>
               <a:rPr lang="en-IN" sz="1400" dirty="0">
-                <a:latin typeface="Arial" panose="020B0604020202020204" pitchFamily="34" charset="0"/>
+                <a:latin typeface="+mn-lt"/>
                 <a:cs typeface="Arial" panose="020B0604020202020204" pitchFamily="34" charset="0"/>
               </a:rPr>
               <a:t>Considering United Kingdom of Great Britain and Northern Ireland as native English speakers</a:t>
@@ -6053,7 +6182,7 @@
               <a:buNone/>
             </a:pPr>
             <a:endParaRPr lang="en-IN" sz="2000" dirty="0">
-              <a:latin typeface="Arial" panose="020B0604020202020204" pitchFamily="34" charset="0"/>
+              <a:latin typeface="+mn-lt"/>
               <a:cs typeface="Arial" panose="020B0604020202020204" pitchFamily="34" charset="0"/>
             </a:endParaRPr>
           </a:p>
@@ -6063,7 +6192,7 @@
             </a:pPr>
             <a:r>
               <a:rPr lang="en-IN" sz="2000" dirty="0">
-                <a:latin typeface="Arial" panose="020B0604020202020204" pitchFamily="34" charset="0"/>
+                <a:latin typeface="+mn-lt"/>
                 <a:cs typeface="Arial" panose="020B0604020202020204" pitchFamily="34" charset="0"/>
               </a:rPr>
               <a:t> </a:t>
@@ -6157,8 +6286,8 @@
           <a:lstStyle/>
           <a:p>
             <a:r>
-              <a:rPr lang="en-IN" sz="2000" dirty="0" smtClean="0">
-                <a:latin typeface="Arial" panose="020B0604020202020204" pitchFamily="34" charset="0"/>
+              <a:rPr lang="en-IN" sz="2000" b="1" dirty="0" smtClean="0">
+                <a:latin typeface="+mn-lt"/>
                 <a:cs typeface="Arial" panose="020B0604020202020204" pitchFamily="34" charset="0"/>
               </a:rPr>
               <a:t>Main Criteria</a:t>
@@ -6168,20 +6297,20 @@
             <a:pPr lvl="1"/>
             <a:r>
               <a:rPr lang="en-IN" sz="1600" dirty="0" smtClean="0">
-                <a:latin typeface="Arial" panose="020B0604020202020204" pitchFamily="34" charset="0"/>
+                <a:latin typeface="+mn-lt"/>
                 <a:cs typeface="Arial" panose="020B0604020202020204" pitchFamily="34" charset="0"/>
               </a:rPr>
               <a:t>Selected </a:t>
             </a:r>
             <a:r>
               <a:rPr lang="en-IN" sz="1600" dirty="0">
-                <a:latin typeface="Arial" panose="020B0604020202020204" pitchFamily="34" charset="0"/>
+                <a:latin typeface="+mn-lt"/>
                 <a:cs typeface="Arial" panose="020B0604020202020204" pitchFamily="34" charset="0"/>
               </a:rPr>
               <a:t>Investment type Venture </a:t>
             </a:r>
             <a:endParaRPr lang="en-IN" sz="1600" dirty="0" smtClean="0">
-              <a:latin typeface="Arial" panose="020B0604020202020204" pitchFamily="34" charset="0"/>
+              <a:latin typeface="+mn-lt"/>
               <a:cs typeface="Arial" panose="020B0604020202020204" pitchFamily="34" charset="0"/>
             </a:endParaRPr>
           </a:p>
@@ -6189,21 +6318,21 @@
             <a:pPr lvl="1"/>
             <a:r>
               <a:rPr lang="en-IN" sz="1600" dirty="0" smtClean="0">
-                <a:latin typeface="Arial" panose="020B0604020202020204" pitchFamily="34" charset="0"/>
+                <a:latin typeface="+mn-lt"/>
                 <a:cs typeface="Arial" panose="020B0604020202020204" pitchFamily="34" charset="0"/>
               </a:rPr>
               <a:t>Top </a:t>
             </a:r>
             <a:r>
               <a:rPr lang="en-IN" sz="1600" dirty="0">
-                <a:latin typeface="Arial" panose="020B0604020202020204" pitchFamily="34" charset="0"/>
+                <a:latin typeface="+mn-lt"/>
                 <a:cs typeface="Arial" panose="020B0604020202020204" pitchFamily="34" charset="0"/>
               </a:rPr>
               <a:t>3 English speaking </a:t>
             </a:r>
             <a:r>
               <a:rPr lang="en-IN" sz="1600" dirty="0" smtClean="0">
-                <a:latin typeface="Arial" panose="020B0604020202020204" pitchFamily="34" charset="0"/>
+                <a:latin typeface="+mn-lt"/>
                 <a:cs typeface="Arial" panose="020B0604020202020204" pitchFamily="34" charset="0"/>
               </a:rPr>
               <a:t>countries</a:t>
@@ -6213,20 +6342,20 @@
             <a:pPr lvl="1"/>
             <a:r>
               <a:rPr lang="en-IN" sz="1600" dirty="0" smtClean="0">
-                <a:latin typeface="Arial" panose="020B0604020202020204" pitchFamily="34" charset="0"/>
+                <a:latin typeface="+mn-lt"/>
                 <a:cs typeface="Arial" panose="020B0604020202020204" pitchFamily="34" charset="0"/>
               </a:rPr>
               <a:t>Each funding between 5 </a:t>
             </a:r>
             <a:r>
               <a:rPr lang="en-IN" sz="1600" dirty="0">
-                <a:latin typeface="Arial" panose="020B0604020202020204" pitchFamily="34" charset="0"/>
+                <a:latin typeface="+mn-lt"/>
                 <a:cs typeface="Arial" panose="020B0604020202020204" pitchFamily="34" charset="0"/>
               </a:rPr>
               <a:t>to 15 M, </a:t>
             </a:r>
             <a:endParaRPr lang="en-IN" sz="1600" dirty="0" smtClean="0">
-              <a:latin typeface="Arial" panose="020B0604020202020204" pitchFamily="34" charset="0"/>
+              <a:latin typeface="+mn-lt"/>
               <a:cs typeface="Arial" panose="020B0604020202020204" pitchFamily="34" charset="0"/>
             </a:endParaRPr>
           </a:p>
@@ -6234,28 +6363,28 @@
             <a:pPr lvl="1"/>
             <a:r>
               <a:rPr lang="en-IN" sz="1600" dirty="0" smtClean="0">
-                <a:latin typeface="Arial" panose="020B0604020202020204" pitchFamily="34" charset="0"/>
+                <a:latin typeface="+mn-lt"/>
                 <a:cs typeface="Arial" panose="020B0604020202020204" pitchFamily="34" charset="0"/>
               </a:rPr>
               <a:t>Best </a:t>
             </a:r>
             <a:r>
               <a:rPr lang="en-IN" sz="1600" dirty="0">
-                <a:latin typeface="Arial" panose="020B0604020202020204" pitchFamily="34" charset="0"/>
+                <a:latin typeface="+mn-lt"/>
                 <a:cs typeface="Arial" panose="020B0604020202020204" pitchFamily="34" charset="0"/>
               </a:rPr>
               <a:t>sectors to invest </a:t>
             </a:r>
             <a:r>
               <a:rPr lang="en-IN" sz="1600" dirty="0" smtClean="0">
-                <a:latin typeface="Arial" panose="020B0604020202020204" pitchFamily="34" charset="0"/>
+                <a:latin typeface="+mn-lt"/>
                 <a:cs typeface="Arial" panose="020B0604020202020204" pitchFamily="34" charset="0"/>
               </a:rPr>
               <a:t>based </a:t>
             </a:r>
             <a:r>
               <a:rPr lang="en-IN" sz="1600" dirty="0">
-                <a:latin typeface="Arial" panose="020B0604020202020204" pitchFamily="34" charset="0"/>
+                <a:latin typeface="+mn-lt"/>
                 <a:cs typeface="Arial" panose="020B0604020202020204" pitchFamily="34" charset="0"/>
               </a:rPr>
               <a:t>on the number of investment on each sector for each country.</a:t>
@@ -6263,20 +6392,20 @@
           </a:p>
           <a:p>
             <a:r>
-              <a:rPr lang="en-IN" sz="2000" dirty="0" smtClean="0">
-                <a:latin typeface="Arial" panose="020B0604020202020204" pitchFamily="34" charset="0"/>
+              <a:rPr lang="en-IN" sz="2000" b="1" dirty="0" smtClean="0">
+                <a:latin typeface="+mn-lt"/>
                 <a:cs typeface="Arial" panose="020B0604020202020204" pitchFamily="34" charset="0"/>
               </a:rPr>
               <a:t>Analysis:</a:t>
             </a:r>
-            <a:endParaRPr lang="en-IN" sz="2000" dirty="0">
-              <a:latin typeface="Arial" panose="020B0604020202020204" pitchFamily="34" charset="0"/>
+            <a:endParaRPr lang="en-IN" sz="2000" b="1" dirty="0">
+              <a:latin typeface="+mn-lt"/>
               <a:cs typeface="Arial" panose="020B0604020202020204" pitchFamily="34" charset="0"/>
             </a:endParaRPr>
           </a:p>
           <a:p>
             <a:endParaRPr lang="en-IN" sz="2000" dirty="0">
-              <a:latin typeface="Arial" panose="020B0604020202020204" pitchFamily="34" charset="0"/>
+              <a:latin typeface="+mn-lt"/>
               <a:cs typeface="Arial" panose="020B0604020202020204" pitchFamily="34" charset="0"/>
             </a:endParaRPr>
           </a:p>
@@ -6285,44 +6414,44 @@
               <a:buNone/>
             </a:pPr>
             <a:endParaRPr lang="en-IN" sz="2000" dirty="0">
-              <a:latin typeface="Arial" panose="020B0604020202020204" pitchFamily="34" charset="0"/>
+              <a:latin typeface="+mn-lt"/>
               <a:cs typeface="Arial" panose="020B0604020202020204" pitchFamily="34" charset="0"/>
             </a:endParaRPr>
           </a:p>
           <a:p>
             <a:endParaRPr lang="en-IN" sz="2000" dirty="0">
-              <a:latin typeface="Arial" panose="020B0604020202020204" pitchFamily="34" charset="0"/>
+              <a:latin typeface="+mn-lt"/>
               <a:cs typeface="Arial" panose="020B0604020202020204" pitchFamily="34" charset="0"/>
             </a:endParaRPr>
           </a:p>
           <a:p>
             <a:endParaRPr lang="en-IN" sz="2000" dirty="0">
-              <a:latin typeface="Arial" panose="020B0604020202020204" pitchFamily="34" charset="0"/>
+              <a:latin typeface="+mn-lt"/>
               <a:cs typeface="Arial" panose="020B0604020202020204" pitchFamily="34" charset="0"/>
             </a:endParaRPr>
           </a:p>
           <a:p>
             <a:endParaRPr lang="en-IN" sz="2000" dirty="0">
-              <a:latin typeface="Arial" panose="020B0604020202020204" pitchFamily="34" charset="0"/>
+              <a:latin typeface="+mn-lt"/>
               <a:cs typeface="Arial" panose="020B0604020202020204" pitchFamily="34" charset="0"/>
             </a:endParaRPr>
           </a:p>
           <a:p>
             <a:endParaRPr lang="en-IN" sz="2000" dirty="0">
-              <a:latin typeface="Arial" panose="020B0604020202020204" pitchFamily="34" charset="0"/>
+              <a:latin typeface="+mn-lt"/>
               <a:cs typeface="Arial" panose="020B0604020202020204" pitchFamily="34" charset="0"/>
             </a:endParaRPr>
           </a:p>
           <a:p>
             <a:endParaRPr lang="en-IN" sz="2000" dirty="0">
-              <a:latin typeface="Arial" panose="020B0604020202020204" pitchFamily="34" charset="0"/>
+              <a:latin typeface="+mn-lt"/>
               <a:cs typeface="Arial" panose="020B0604020202020204" pitchFamily="34" charset="0"/>
             </a:endParaRPr>
           </a:p>
           <a:p>
             <a:r>
-              <a:rPr lang="en-US" sz="2000" dirty="0" smtClean="0">
-                <a:latin typeface="Arial" panose="020B0604020202020204" pitchFamily="34" charset="0"/>
+              <a:rPr lang="en-US" sz="2000" b="1" dirty="0" smtClean="0">
+                <a:latin typeface="+mn-lt"/>
                 <a:cs typeface="Arial" panose="020B0604020202020204" pitchFamily="34" charset="0"/>
               </a:rPr>
               <a:t>Results/ Recommendation</a:t>
@@ -6332,34 +6461,34 @@
             <a:pPr lvl="1"/>
             <a:r>
               <a:rPr lang="en-US" sz="1600" dirty="0" smtClean="0">
-                <a:latin typeface="Arial" panose="020B0604020202020204" pitchFamily="34" charset="0"/>
+                <a:latin typeface="+mn-lt"/>
                 <a:cs typeface="Arial" panose="020B0604020202020204" pitchFamily="34" charset="0"/>
               </a:rPr>
               <a:t>Sector Others </a:t>
             </a:r>
             <a:r>
               <a:rPr lang="en-US" sz="1600" dirty="0">
-                <a:latin typeface="Arial" panose="020B0604020202020204" pitchFamily="34" charset="0"/>
+                <a:latin typeface="+mn-lt"/>
                 <a:cs typeface="Arial" panose="020B0604020202020204" pitchFamily="34" charset="0"/>
               </a:rPr>
               <a:t>and "Social, Finance, Analytics, Advertising" are </a:t>
             </a:r>
             <a:r>
               <a:rPr lang="en-US" sz="1600" dirty="0" smtClean="0">
-                <a:latin typeface="Arial" panose="020B0604020202020204" pitchFamily="34" charset="0"/>
+                <a:latin typeface="+mn-lt"/>
                 <a:cs typeface="Arial" panose="020B0604020202020204" pitchFamily="34" charset="0"/>
               </a:rPr>
               <a:t>first 2 preferred </a:t>
             </a:r>
             <a:r>
               <a:rPr lang="en-US" sz="1600" dirty="0">
-                <a:latin typeface="Arial" panose="020B0604020202020204" pitchFamily="34" charset="0"/>
+                <a:latin typeface="+mn-lt"/>
                 <a:cs typeface="Arial" panose="020B0604020202020204" pitchFamily="34" charset="0"/>
               </a:rPr>
               <a:t>sector for all 3 countries.</a:t>
             </a:r>
             <a:endParaRPr lang="en-IN" sz="1600" dirty="0" smtClean="0">
-              <a:latin typeface="Arial" panose="020B0604020202020204" pitchFamily="34" charset="0"/>
+              <a:latin typeface="+mn-lt"/>
               <a:cs typeface="Arial" panose="020B0604020202020204" pitchFamily="34" charset="0"/>
             </a:endParaRPr>
           </a:p>
@@ -6367,74 +6496,76 @@
             <a:pPr lvl="1"/>
             <a:r>
               <a:rPr lang="en-IN" sz="1600" dirty="0" smtClean="0">
-                <a:latin typeface="Arial" panose="020B0604020202020204" pitchFamily="34" charset="0"/>
+                <a:latin typeface="+mn-lt"/>
                 <a:cs typeface="Arial" panose="020B0604020202020204" pitchFamily="34" charset="0"/>
               </a:rPr>
               <a:t>“</a:t>
             </a:r>
             <a:r>
-              <a:rPr lang="en-US" sz="1600" dirty="0"/>
+              <a:rPr lang="en-US" sz="1600" dirty="0">
+                <a:latin typeface="+mn-lt"/>
+              </a:rPr>
               <a:t>Cleantech / Semiconductors</a:t>
             </a:r>
             <a:r>
               <a:rPr lang="en-IN" sz="1600" dirty="0">
-                <a:latin typeface="Arial" panose="020B0604020202020204" pitchFamily="34" charset="0"/>
+                <a:latin typeface="+mn-lt"/>
                 <a:cs typeface="Arial" panose="020B0604020202020204" pitchFamily="34" charset="0"/>
               </a:rPr>
               <a:t>” </a:t>
             </a:r>
             <a:r>
               <a:rPr lang="en-IN" sz="1600" dirty="0" smtClean="0">
-                <a:latin typeface="Arial" panose="020B0604020202020204" pitchFamily="34" charset="0"/>
+                <a:latin typeface="+mn-lt"/>
                 <a:cs typeface="Arial" panose="020B0604020202020204" pitchFamily="34" charset="0"/>
               </a:rPr>
               <a:t>is the 3</a:t>
             </a:r>
             <a:r>
               <a:rPr lang="en-IN" sz="1600" baseline="30000" dirty="0" smtClean="0">
-                <a:latin typeface="Arial" panose="020B0604020202020204" pitchFamily="34" charset="0"/>
+                <a:latin typeface="+mn-lt"/>
                 <a:cs typeface="Arial" panose="020B0604020202020204" pitchFamily="34" charset="0"/>
               </a:rPr>
               <a:t>rd</a:t>
             </a:r>
             <a:r>
               <a:rPr lang="en-IN" sz="1600" dirty="0" smtClean="0">
-                <a:latin typeface="Arial" panose="020B0604020202020204" pitchFamily="34" charset="0"/>
+                <a:latin typeface="+mn-lt"/>
                 <a:cs typeface="Arial" panose="020B0604020202020204" pitchFamily="34" charset="0"/>
               </a:rPr>
               <a:t> </a:t>
             </a:r>
             <a:r>
               <a:rPr lang="en-IN" sz="1600" dirty="0">
-                <a:latin typeface="Arial" panose="020B0604020202020204" pitchFamily="34" charset="0"/>
+                <a:latin typeface="+mn-lt"/>
                 <a:cs typeface="Arial" panose="020B0604020202020204" pitchFamily="34" charset="0"/>
               </a:rPr>
               <a:t>preferred sector for US and </a:t>
             </a:r>
             <a:r>
               <a:rPr lang="en-IN" sz="1600" dirty="0" smtClean="0">
-                <a:latin typeface="Arial" panose="020B0604020202020204" pitchFamily="34" charset="0"/>
+                <a:latin typeface="+mn-lt"/>
                 <a:cs typeface="Arial" panose="020B0604020202020204" pitchFamily="34" charset="0"/>
               </a:rPr>
               <a:t>UK but for </a:t>
             </a:r>
             <a:r>
               <a:rPr lang="en-IN" sz="1600" dirty="0">
-                <a:latin typeface="Arial" panose="020B0604020202020204" pitchFamily="34" charset="0"/>
+                <a:latin typeface="+mn-lt"/>
                 <a:cs typeface="Arial" panose="020B0604020202020204" pitchFamily="34" charset="0"/>
               </a:rPr>
               <a:t>India 3</a:t>
             </a:r>
             <a:r>
               <a:rPr lang="en-IN" sz="1600" baseline="30000" dirty="0">
-                <a:latin typeface="Arial" panose="020B0604020202020204" pitchFamily="34" charset="0"/>
+                <a:latin typeface="+mn-lt"/>
                 <a:cs typeface="Arial" panose="020B0604020202020204" pitchFamily="34" charset="0"/>
               </a:rPr>
               <a:t>rd</a:t>
             </a:r>
             <a:r>
               <a:rPr lang="en-IN" sz="1600" dirty="0">
-                <a:latin typeface="Arial" panose="020B0604020202020204" pitchFamily="34" charset="0"/>
+                <a:latin typeface="+mn-lt"/>
                 <a:cs typeface="Arial" panose="020B0604020202020204" pitchFamily="34" charset="0"/>
               </a:rPr>
               <a:t> Preferred sector is “News, Search and Messaging”</a:t>
@@ -6442,7 +6573,7 @@
           </a:p>
           <a:p>
             <a:endParaRPr lang="en-IN" sz="2000" dirty="0">
-              <a:latin typeface="Arial" panose="020B0604020202020204" pitchFamily="34" charset="0"/>
+              <a:latin typeface="+mn-lt"/>
               <a:cs typeface="Arial" panose="020B0604020202020204" pitchFamily="34" charset="0"/>
             </a:endParaRPr>
           </a:p>
@@ -6474,21 +6605,21 @@
                 <a:gridCol w="3894264">
                   <a:extLst>
                     <a:ext uri="{9D8B030D-6E8A-4147-A177-3AD203B41FA5}">
-                      <a16:colId xmlns:a16="http://schemas.microsoft.com/office/drawing/2014/main" val="291982254"/>
+                      <a16:colId xmlns:a16="http://schemas.microsoft.com/office/drawing/2014/main" xmlns="" val="291982254"/>
                     </a:ext>
                   </a:extLst>
                 </a:gridCol>
                 <a:gridCol w="2911857">
                   <a:extLst>
                     <a:ext uri="{9D8B030D-6E8A-4147-A177-3AD203B41FA5}">
-                      <a16:colId xmlns:a16="http://schemas.microsoft.com/office/drawing/2014/main" val="1246545029"/>
+                      <a16:colId xmlns:a16="http://schemas.microsoft.com/office/drawing/2014/main" xmlns="" val="1246545029"/>
                     </a:ext>
                   </a:extLst>
                 </a:gridCol>
                 <a:gridCol w="956944">
                   <a:extLst>
                     <a:ext uri="{9D8B030D-6E8A-4147-A177-3AD203B41FA5}">
-                      <a16:colId xmlns:a16="http://schemas.microsoft.com/office/drawing/2014/main" val="1342740634"/>
+                      <a16:colId xmlns:a16="http://schemas.microsoft.com/office/drawing/2014/main" xmlns="" val="1342740634"/>
                     </a:ext>
                   </a:extLst>
                 </a:gridCol>
@@ -6683,7 +6814,7 @@
                 </a:tc>
                 <a:extLst>
                   <a:ext uri="{0D108BD9-81ED-4DB2-BD59-A6C34878D82A}">
-                    <a16:rowId xmlns:a16="http://schemas.microsoft.com/office/drawing/2014/main" val="3517442308"/>
+                    <a16:rowId xmlns:a16="http://schemas.microsoft.com/office/drawing/2014/main" xmlns="" val="3517442308"/>
                   </a:ext>
                 </a:extLst>
               </a:tr>
@@ -6867,7 +6998,7 @@
                 </a:tc>
                 <a:extLst>
                   <a:ext uri="{0D108BD9-81ED-4DB2-BD59-A6C34878D82A}">
-                    <a16:rowId xmlns:a16="http://schemas.microsoft.com/office/drawing/2014/main" val="3531670908"/>
+                    <a16:rowId xmlns:a16="http://schemas.microsoft.com/office/drawing/2014/main" xmlns="" val="3531670908"/>
                   </a:ext>
                 </a:extLst>
               </a:tr>
@@ -7001,7 +7132,7 @@
                 </a:tc>
                 <a:extLst>
                   <a:ext uri="{0D108BD9-81ED-4DB2-BD59-A6C34878D82A}">
-                    <a16:rowId xmlns:a16="http://schemas.microsoft.com/office/drawing/2014/main" val="1203328400"/>
+                    <a16:rowId xmlns:a16="http://schemas.microsoft.com/office/drawing/2014/main" xmlns="" val="1203328400"/>
                   </a:ext>
                 </a:extLst>
               </a:tr>
@@ -7135,7 +7266,7 @@
                 </a:tc>
                 <a:extLst>
                   <a:ext uri="{0D108BD9-81ED-4DB2-BD59-A6C34878D82A}">
-                    <a16:rowId xmlns:a16="http://schemas.microsoft.com/office/drawing/2014/main" val="613166261"/>
+                    <a16:rowId xmlns:a16="http://schemas.microsoft.com/office/drawing/2014/main" xmlns="" val="613166261"/>
                   </a:ext>
                 </a:extLst>
               </a:tr>
@@ -7319,7 +7450,7 @@
                 </a:tc>
                 <a:extLst>
                   <a:ext uri="{0D108BD9-81ED-4DB2-BD59-A6C34878D82A}">
-                    <a16:rowId xmlns:a16="http://schemas.microsoft.com/office/drawing/2014/main" val="1665349679"/>
+                    <a16:rowId xmlns:a16="http://schemas.microsoft.com/office/drawing/2014/main" xmlns="" val="1665349679"/>
                   </a:ext>
                 </a:extLst>
               </a:tr>
@@ -7453,7 +7584,7 @@
                 </a:tc>
                 <a:extLst>
                   <a:ext uri="{0D108BD9-81ED-4DB2-BD59-A6C34878D82A}">
-                    <a16:rowId xmlns:a16="http://schemas.microsoft.com/office/drawing/2014/main" val="2914304785"/>
+                    <a16:rowId xmlns:a16="http://schemas.microsoft.com/office/drawing/2014/main" xmlns="" val="2914304785"/>
                   </a:ext>
                 </a:extLst>
               </a:tr>
@@ -7587,7 +7718,7 @@
                 </a:tc>
                 <a:extLst>
                   <a:ext uri="{0D108BD9-81ED-4DB2-BD59-A6C34878D82A}">
-                    <a16:rowId xmlns:a16="http://schemas.microsoft.com/office/drawing/2014/main" val="3405451346"/>
+                    <a16:rowId xmlns:a16="http://schemas.microsoft.com/office/drawing/2014/main" xmlns="" val="3405451346"/>
                   </a:ext>
                 </a:extLst>
               </a:tr>
@@ -7771,7 +7902,7 @@
                 </a:tc>
                 <a:extLst>
                   <a:ext uri="{0D108BD9-81ED-4DB2-BD59-A6C34878D82A}">
-                    <a16:rowId xmlns:a16="http://schemas.microsoft.com/office/drawing/2014/main" val="3355511291"/>
+                    <a16:rowId xmlns:a16="http://schemas.microsoft.com/office/drawing/2014/main" xmlns="" val="3355511291"/>
                   </a:ext>
                 </a:extLst>
               </a:tr>
@@ -7905,7 +8036,7 @@
                 </a:tc>
                 <a:extLst>
                   <a:ext uri="{0D108BD9-81ED-4DB2-BD59-A6C34878D82A}">
-                    <a16:rowId xmlns:a16="http://schemas.microsoft.com/office/drawing/2014/main" val="717870125"/>
+                    <a16:rowId xmlns:a16="http://schemas.microsoft.com/office/drawing/2014/main" xmlns="" val="717870125"/>
                   </a:ext>
                 </a:extLst>
               </a:tr>
@@ -8039,7 +8170,7 @@
                 </a:tc>
                 <a:extLst>
                   <a:ext uri="{0D108BD9-81ED-4DB2-BD59-A6C34878D82A}">
-                    <a16:rowId xmlns:a16="http://schemas.microsoft.com/office/drawing/2014/main" val="1789876725"/>
+                    <a16:rowId xmlns:a16="http://schemas.microsoft.com/office/drawing/2014/main" xmlns="" val="1789876725"/>
                   </a:ext>
                 </a:extLst>
               </a:tr>
@@ -8112,7 +8243,7 @@
           <p:cNvPr id="8" name="Content Placeholder 7">
             <a:extLst>
               <a:ext uri="{FF2B5EF4-FFF2-40B4-BE49-F238E27FC236}">
-                <a16:creationId xmlns:a16="http://schemas.microsoft.com/office/drawing/2014/main" id="{E6396020-9C60-444E-872D-855C94FD8851}"/>
+                <a16:creationId xmlns:a16="http://schemas.microsoft.com/office/drawing/2014/main" xmlns="" id="{E6396020-9C60-444E-872D-855C94FD8851}"/>
               </a:ext>
             </a:extLst>
           </p:cNvPr>
@@ -8204,7 +8335,7 @@
           <p:cNvPr id="8" name="Content Placeholder 7">
             <a:extLst>
               <a:ext uri="{FF2B5EF4-FFF2-40B4-BE49-F238E27FC236}">
-                <a16:creationId xmlns:a16="http://schemas.microsoft.com/office/drawing/2014/main" id="{05ADA345-B64A-49BF-B7C2-DDA52E06DCD5}"/>
+                <a16:creationId xmlns:a16="http://schemas.microsoft.com/office/drawing/2014/main" xmlns="" id="{05ADA345-B64A-49BF-B7C2-DDA52E06DCD5}"/>
               </a:ext>
             </a:extLst>
           </p:cNvPr>
@@ -8295,7 +8426,7 @@
           <p:cNvPr id="8" name="Picture 7">
             <a:extLst>
               <a:ext uri="{FF2B5EF4-FFF2-40B4-BE49-F238E27FC236}">
-                <a16:creationId xmlns:a16="http://schemas.microsoft.com/office/drawing/2014/main" id="{832B11E5-B06A-4437-B707-6942224E53DD}"/>
+                <a16:creationId xmlns:a16="http://schemas.microsoft.com/office/drawing/2014/main" xmlns="" id="{832B11E5-B06A-4437-B707-6942224E53DD}"/>
               </a:ext>
             </a:extLst>
           </p:cNvPr>
@@ -8312,7 +8443,7 @@
         </p:blipFill>
         <p:spPr>
           <a:xfrm>
-            <a:off x="1136468" y="1891144"/>
+            <a:off x="1103015" y="1489701"/>
             <a:ext cx="10296895" cy="4326776"/>
           </a:xfrm>
           <a:prstGeom prst="rect">
@@ -8320,6 +8451,258 @@
           </a:prstGeom>
         </p:spPr>
       </p:pic>
+      <p:sp>
+        <p:nvSpPr>
+          <p:cNvPr id="2" name="TextBox 1"/>
+          <p:cNvSpPr txBox="1"/>
+          <p:nvPr/>
+        </p:nvSpPr>
+        <p:spPr>
+          <a:xfrm>
+            <a:off x="223025" y="5940921"/>
+            <a:ext cx="3802566" cy="646331"/>
+          </a:xfrm>
+          <a:prstGeom prst="rect">
+            <a:avLst/>
+          </a:prstGeom>
+          <a:noFill/>
+        </p:spPr>
+        <p:txBody>
+          <a:bodyPr wrap="square" rtlCol="0">
+            <a:spAutoFit/>
+          </a:bodyPr>
+          <a:lstStyle/>
+          <a:p>
+            <a:r>
+              <a:rPr lang="en-US" sz="1200" dirty="0" smtClean="0">
+                <a:solidFill>
+                  <a:schemeClr val="bg1">
+                    <a:lumMod val="50000"/>
+                  </a:schemeClr>
+                </a:solidFill>
+              </a:rPr>
+              <a:t>Top 2 primary sectors for USA and Others main sector:</a:t>
+            </a:r>
+          </a:p>
+          <a:p>
+            <a:pPr marL="228600" indent="-228600">
+              <a:buFont typeface="+mj-lt"/>
+              <a:buAutoNum type="arabicPeriod"/>
+            </a:pPr>
+            <a:r>
+              <a:rPr lang="en-US" sz="1200" dirty="0">
+                <a:solidFill>
+                  <a:schemeClr val="bg1">
+                    <a:lumMod val="50000"/>
+                  </a:schemeClr>
+                </a:solidFill>
+              </a:rPr>
+              <a:t>software</a:t>
+            </a:r>
+            <a:endParaRPr lang="en-US" sz="1200" dirty="0" smtClean="0">
+              <a:solidFill>
+                <a:schemeClr val="bg1">
+                  <a:lumMod val="50000"/>
+                </a:schemeClr>
+              </a:solidFill>
+            </a:endParaRPr>
+          </a:p>
+          <a:p>
+            <a:pPr marL="228600" indent="-228600">
+              <a:buFont typeface="+mj-lt"/>
+              <a:buAutoNum type="arabicPeriod"/>
+            </a:pPr>
+            <a:r>
+              <a:rPr lang="en-US" sz="1200" dirty="0">
+                <a:solidFill>
+                  <a:schemeClr val="bg1">
+                    <a:lumMod val="50000"/>
+                  </a:schemeClr>
+                </a:solidFill>
+              </a:rPr>
+              <a:t>enterprise software</a:t>
+            </a:r>
+            <a:endParaRPr lang="en-US" dirty="0">
+              <a:solidFill>
+                <a:schemeClr val="bg1">
+                  <a:lumMod val="50000"/>
+                </a:schemeClr>
+              </a:solidFill>
+            </a:endParaRPr>
+          </a:p>
+        </p:txBody>
+      </p:sp>
+      <p:sp>
+        <p:nvSpPr>
+          <p:cNvPr id="5" name="TextBox 4"/>
+          <p:cNvSpPr txBox="1"/>
+          <p:nvPr/>
+        </p:nvSpPr>
+        <p:spPr>
+          <a:xfrm>
+            <a:off x="3743093" y="5940921"/>
+            <a:ext cx="3802566" cy="646331"/>
+          </a:xfrm>
+          <a:prstGeom prst="rect">
+            <a:avLst/>
+          </a:prstGeom>
+          <a:noFill/>
+        </p:spPr>
+        <p:txBody>
+          <a:bodyPr wrap="square" rtlCol="0">
+            <a:spAutoFit/>
+          </a:bodyPr>
+          <a:lstStyle/>
+          <a:p>
+            <a:r>
+              <a:rPr lang="en-US" sz="1200" dirty="0" smtClean="0">
+                <a:solidFill>
+                  <a:schemeClr val="bg1">
+                    <a:lumMod val="50000"/>
+                  </a:schemeClr>
+                </a:solidFill>
+              </a:rPr>
+              <a:t>Top 2 primary sectors for UK and Others main sector:</a:t>
+            </a:r>
+          </a:p>
+          <a:p>
+            <a:pPr marL="228600" indent="-228600">
+              <a:buFont typeface="+mj-lt"/>
+              <a:buAutoNum type="arabicPeriod"/>
+            </a:pPr>
+            <a:r>
+              <a:rPr lang="en-US" sz="1200" dirty="0">
+                <a:solidFill>
+                  <a:schemeClr val="bg1">
+                    <a:lumMod val="50000"/>
+                  </a:schemeClr>
+                </a:solidFill>
+              </a:rPr>
+              <a:t>software</a:t>
+            </a:r>
+            <a:endParaRPr lang="en-US" sz="1200" dirty="0" smtClean="0">
+              <a:solidFill>
+                <a:schemeClr val="bg1">
+                  <a:lumMod val="50000"/>
+                </a:schemeClr>
+              </a:solidFill>
+            </a:endParaRPr>
+          </a:p>
+          <a:p>
+            <a:pPr marL="228600" indent="-228600">
+              <a:buFont typeface="+mj-lt"/>
+              <a:buAutoNum type="arabicPeriod"/>
+            </a:pPr>
+            <a:r>
+              <a:rPr lang="en-US" sz="1200" dirty="0">
+                <a:solidFill>
+                  <a:schemeClr val="bg1">
+                    <a:lumMod val="50000"/>
+                  </a:schemeClr>
+                </a:solidFill>
+              </a:rPr>
+              <a:t>e-commerce</a:t>
+            </a:r>
+            <a:endParaRPr lang="en-US" dirty="0">
+              <a:solidFill>
+                <a:schemeClr val="bg1">
+                  <a:lumMod val="50000"/>
+                </a:schemeClr>
+              </a:solidFill>
+            </a:endParaRPr>
+          </a:p>
+        </p:txBody>
+      </p:sp>
+      <p:sp>
+        <p:nvSpPr>
+          <p:cNvPr id="7" name="TextBox 6"/>
+          <p:cNvSpPr txBox="1"/>
+          <p:nvPr/>
+        </p:nvSpPr>
+        <p:spPr>
+          <a:xfrm>
+            <a:off x="7263161" y="5942927"/>
+            <a:ext cx="3802566" cy="923330"/>
+          </a:xfrm>
+          <a:prstGeom prst="rect">
+            <a:avLst/>
+          </a:prstGeom>
+          <a:noFill/>
+        </p:spPr>
+        <p:txBody>
+          <a:bodyPr wrap="square" rtlCol="0">
+            <a:spAutoFit/>
+          </a:bodyPr>
+          <a:lstStyle/>
+          <a:p>
+            <a:r>
+              <a:rPr lang="en-US" sz="1200" dirty="0" smtClean="0">
+                <a:solidFill>
+                  <a:schemeClr val="bg1">
+                    <a:lumMod val="50000"/>
+                  </a:schemeClr>
+                </a:solidFill>
+              </a:rPr>
+              <a:t>Top 2 primary sectors for India and Others main sector:</a:t>
+            </a:r>
+          </a:p>
+          <a:p>
+            <a:pPr marL="228600" indent="-228600">
+              <a:buFont typeface="+mj-lt"/>
+              <a:buAutoNum type="arabicPeriod"/>
+            </a:pPr>
+            <a:r>
+              <a:rPr lang="en-US" sz="1200" dirty="0">
+                <a:solidFill>
+                  <a:schemeClr val="bg1">
+                    <a:lumMod val="50000"/>
+                  </a:schemeClr>
+                </a:solidFill>
+              </a:rPr>
+              <a:t>e-commerce</a:t>
+            </a:r>
+            <a:endParaRPr lang="en-US" sz="1200" dirty="0" smtClean="0">
+              <a:solidFill>
+                <a:schemeClr val="bg1">
+                  <a:lumMod val="50000"/>
+                </a:schemeClr>
+              </a:solidFill>
+            </a:endParaRPr>
+          </a:p>
+          <a:p>
+            <a:pPr marL="228600" indent="-228600">
+              <a:buFont typeface="+mj-lt"/>
+              <a:buAutoNum type="arabicPeriod"/>
+            </a:pPr>
+            <a:r>
+              <a:rPr lang="en-US" sz="1200" dirty="0">
+                <a:solidFill>
+                  <a:schemeClr val="bg1">
+                    <a:lumMod val="50000"/>
+                  </a:schemeClr>
+                </a:solidFill>
+              </a:rPr>
+              <a:t>software</a:t>
+            </a:r>
+            <a:endParaRPr lang="en-US" sz="1200" dirty="0" smtClean="0">
+              <a:solidFill>
+                <a:schemeClr val="bg1">
+                  <a:lumMod val="50000"/>
+                </a:schemeClr>
+              </a:solidFill>
+            </a:endParaRPr>
+          </a:p>
+          <a:p>
+            <a:endParaRPr lang="en-US" dirty="0">
+              <a:solidFill>
+                <a:schemeClr val="bg1">
+                  <a:lumMod val="50000"/>
+                </a:schemeClr>
+              </a:solidFill>
+            </a:endParaRPr>
+          </a:p>
+        </p:txBody>
+      </p:sp>
     </p:spTree>
     <p:extLst>
       <p:ext uri="{BB962C8B-B14F-4D97-AF65-F5344CB8AC3E}">

</xml_diff>